<commit_message>
WIP: Skiller lister til enkel rekursiv kode og høyereordends kode Oppdaterer presentasjon men mye igjen
</commit_message>
<xml_diff>
--- a/presentation/FunctionalProgramming0.pptx
+++ b/presentation/FunctionalProgramming0.pptx
@@ -11,6 +11,7 @@
     <p:sldId id="259" r:id="rId5"/>
     <p:sldId id="260" r:id="rId6"/>
     <p:sldId id="261" r:id="rId7"/>
+    <p:sldId id="262" r:id="rId8"/>
   </p:sldIdLst>
   <p:sldSz cx="9144000" cy="6858000" type="screen4x3"/>
   <p:notesSz cx="6858000" cy="9144000"/>
@@ -293,7 +294,7 @@
           <a:p>
             <a:fld id="{17AEFA35-710C-194C-96B4-31CA43E62063}" type="datetimeFigureOut">
               <a:rPr lang="en-US" smtClean="0"/>
-              <a:t>03.12.14</a:t>
+              <a:t>02.02.15</a:t>
             </a:fld>
             <a:endParaRPr lang="en-US"/>
           </a:p>
@@ -463,7 +464,7 @@
           <a:p>
             <a:fld id="{17AEFA35-710C-194C-96B4-31CA43E62063}" type="datetimeFigureOut">
               <a:rPr lang="en-US" smtClean="0"/>
-              <a:t>03.12.14</a:t>
+              <a:t>02.02.15</a:t>
             </a:fld>
             <a:endParaRPr lang="en-US"/>
           </a:p>
@@ -643,7 +644,7 @@
           <a:p>
             <a:fld id="{17AEFA35-710C-194C-96B4-31CA43E62063}" type="datetimeFigureOut">
               <a:rPr lang="en-US" smtClean="0"/>
-              <a:t>03.12.14</a:t>
+              <a:t>02.02.15</a:t>
             </a:fld>
             <a:endParaRPr lang="en-US"/>
           </a:p>
@@ -813,7 +814,7 @@
           <a:p>
             <a:fld id="{17AEFA35-710C-194C-96B4-31CA43E62063}" type="datetimeFigureOut">
               <a:rPr lang="en-US" smtClean="0"/>
-              <a:t>03.12.14</a:t>
+              <a:t>02.02.15</a:t>
             </a:fld>
             <a:endParaRPr lang="en-US"/>
           </a:p>
@@ -1059,7 +1060,7 @@
           <a:p>
             <a:fld id="{17AEFA35-710C-194C-96B4-31CA43E62063}" type="datetimeFigureOut">
               <a:rPr lang="en-US" smtClean="0"/>
-              <a:t>03.12.14</a:t>
+              <a:t>02.02.15</a:t>
             </a:fld>
             <a:endParaRPr lang="en-US"/>
           </a:p>
@@ -1347,7 +1348,7 @@
           <a:p>
             <a:fld id="{17AEFA35-710C-194C-96B4-31CA43E62063}" type="datetimeFigureOut">
               <a:rPr lang="en-US" smtClean="0"/>
-              <a:t>03.12.14</a:t>
+              <a:t>02.02.15</a:t>
             </a:fld>
             <a:endParaRPr lang="en-US"/>
           </a:p>
@@ -1769,7 +1770,7 @@
           <a:p>
             <a:fld id="{17AEFA35-710C-194C-96B4-31CA43E62063}" type="datetimeFigureOut">
               <a:rPr lang="en-US" smtClean="0"/>
-              <a:t>03.12.14</a:t>
+              <a:t>02.02.15</a:t>
             </a:fld>
             <a:endParaRPr lang="en-US"/>
           </a:p>
@@ -1887,7 +1888,7 @@
           <a:p>
             <a:fld id="{17AEFA35-710C-194C-96B4-31CA43E62063}" type="datetimeFigureOut">
               <a:rPr lang="en-US" smtClean="0"/>
-              <a:t>03.12.14</a:t>
+              <a:t>02.02.15</a:t>
             </a:fld>
             <a:endParaRPr lang="en-US"/>
           </a:p>
@@ -1982,7 +1983,7 @@
           <a:p>
             <a:fld id="{17AEFA35-710C-194C-96B4-31CA43E62063}" type="datetimeFigureOut">
               <a:rPr lang="en-US" smtClean="0"/>
-              <a:t>03.12.14</a:t>
+              <a:t>02.02.15</a:t>
             </a:fld>
             <a:endParaRPr lang="en-US"/>
           </a:p>
@@ -2259,7 +2260,7 @@
           <a:p>
             <a:fld id="{17AEFA35-710C-194C-96B4-31CA43E62063}" type="datetimeFigureOut">
               <a:rPr lang="en-US" smtClean="0"/>
-              <a:t>03.12.14</a:t>
+              <a:t>02.02.15</a:t>
             </a:fld>
             <a:endParaRPr lang="en-US"/>
           </a:p>
@@ -2512,7 +2513,7 @@
           <a:p>
             <a:fld id="{17AEFA35-710C-194C-96B4-31CA43E62063}" type="datetimeFigureOut">
               <a:rPr lang="en-US" smtClean="0"/>
-              <a:t>03.12.14</a:t>
+              <a:t>02.02.15</a:t>
             </a:fld>
             <a:endParaRPr lang="en-US"/>
           </a:p>
@@ -2725,7 +2726,7 @@
           <a:p>
             <a:fld id="{17AEFA35-710C-194C-96B4-31CA43E62063}" type="datetimeFigureOut">
               <a:rPr lang="en-US" smtClean="0"/>
-              <a:t>03.12.14</a:t>
+              <a:t>02.02.15</a:t>
             </a:fld>
             <a:endParaRPr lang="en-US"/>
           </a:p>
@@ -3255,8 +3256,12 @@
               <a:t> </a:t>
             </a:r>
             <a:r>
-              <a:rPr lang="en-US" dirty="0" err="1" smtClean="0"/>
-              <a:t>programmering</a:t>
+              <a:rPr lang="en-US" dirty="0" err="1"/>
+              <a:t>P</a:t>
+            </a:r>
+            <a:r>
+              <a:rPr lang="en-US" dirty="0" err="1" smtClean="0"/>
+              <a:t>rogrammering</a:t>
             </a:r>
             <a:r>
               <a:rPr lang="en-US" dirty="0" smtClean="0"/>
@@ -3298,12 +3303,16 @@
           <a:p>
             <a:r>
               <a:rPr lang="en-US" dirty="0" smtClean="0"/>
-              <a:t>“Pure” </a:t>
+              <a:t>Rene </a:t>
             </a:r>
             <a:r>
               <a:rPr lang="en-US" dirty="0" err="1" smtClean="0"/>
               <a:t>funksjoner</a:t>
             </a:r>
+            <a:r>
+              <a:rPr lang="en-US" dirty="0" smtClean="0"/>
+              <a:t> (pure functions)</a:t>
+            </a:r>
             <a:endParaRPr lang="en-US" dirty="0" smtClean="0"/>
           </a:p>
           <a:p>
@@ -3339,7 +3348,7 @@
               <a:t> </a:t>
             </a:r>
             <a:r>
-              <a:rPr lang="en-US" smtClean="0"/>
+              <a:rPr lang="en-US" dirty="0" err="1" smtClean="0"/>
               <a:t>funksjoner</a:t>
             </a:r>
             <a:endParaRPr lang="en-US" dirty="0" smtClean="0"/>
@@ -3388,11 +3397,11 @@
           <a:p>
             <a:r>
               <a:rPr lang="en-US" dirty="0" smtClean="0"/>
-              <a:t>Expressions </a:t>
-            </a:r>
-            <a:r>
-              <a:rPr lang="en-US" dirty="0" err="1" smtClean="0"/>
-              <a:t>ikke</a:t>
+              <a:t>Expressions, </a:t>
+            </a:r>
+            <a:r>
+              <a:rPr lang="en-US" dirty="0" smtClean="0"/>
+              <a:t>not</a:t>
             </a:r>
             <a:r>
               <a:rPr lang="en-US" dirty="0" smtClean="0"/>
@@ -3449,7 +3458,7 @@
           <a:p>
             <a:r>
               <a:rPr lang="en-US" dirty="0" err="1" smtClean="0"/>
-              <a:t>Fordeler</a:t>
+              <a:t>Førsteklasses</a:t>
             </a:r>
             <a:r>
               <a:rPr lang="en-US" dirty="0" smtClean="0"/>
@@ -3457,7 +3466,34 @@
             </a:r>
             <a:r>
               <a:rPr lang="en-US" dirty="0" err="1" smtClean="0"/>
-              <a:t>førsteklasse</a:t>
+              <a:t>funksjoner</a:t>
+            </a:r>
+            <a:r>
+              <a:rPr lang="en-US" dirty="0" smtClean="0"/>
+              <a:t>	</a:t>
+            </a:r>
+            <a:endParaRPr lang="en-US" dirty="0"/>
+          </a:p>
+        </p:txBody>
+      </p:sp>
+      <p:sp>
+        <p:nvSpPr>
+          <p:cNvPr id="3" name="Content Placeholder 2"/>
+          <p:cNvSpPr>
+            <a:spLocks noGrp="1"/>
+          </p:cNvSpPr>
+          <p:nvPr>
+            <p:ph idx="1"/>
+          </p:nvPr>
+        </p:nvSpPr>
+        <p:spPr/>
+        <p:txBody>
+          <a:bodyPr/>
+          <a:lstStyle/>
+          <a:p>
+            <a:r>
+              <a:rPr lang="en-US" dirty="0" err="1" smtClean="0"/>
+              <a:t>Hva</a:t>
             </a:r>
             <a:r>
               <a:rPr lang="en-US" dirty="0" smtClean="0"/>
@@ -3465,34 +3501,7 @@
             </a:r>
             <a:r>
               <a:rPr lang="en-US" dirty="0" err="1" smtClean="0"/>
-              <a:t>funksjoner</a:t>
-            </a:r>
-            <a:r>
-              <a:rPr lang="en-US" dirty="0" smtClean="0"/>
-              <a:t>	</a:t>
-            </a:r>
-            <a:endParaRPr lang="en-US" dirty="0"/>
-          </a:p>
-        </p:txBody>
-      </p:sp>
-      <p:sp>
-        <p:nvSpPr>
-          <p:cNvPr id="3" name="Content Placeholder 2"/>
-          <p:cNvSpPr>
-            <a:spLocks noGrp="1"/>
-          </p:cNvSpPr>
-          <p:nvPr>
-            <p:ph idx="1"/>
-          </p:nvPr>
-        </p:nvSpPr>
-        <p:spPr/>
-        <p:txBody>
-          <a:bodyPr/>
-          <a:lstStyle/>
-          <a:p>
-            <a:r>
-              <a:rPr lang="en-US" dirty="0" err="1" smtClean="0"/>
-              <a:t>Flere</a:t>
+              <a:t>er</a:t>
             </a:r>
             <a:r>
               <a:rPr lang="en-US" dirty="0" smtClean="0"/>
@@ -3500,38 +3509,22 @@
             </a:r>
             <a:r>
               <a:rPr lang="en-US" dirty="0" err="1" smtClean="0"/>
-              <a:t>verktøy</a:t>
-            </a:r>
-            <a:r>
-              <a:rPr lang="en-US" dirty="0" smtClean="0"/>
-              <a:t> </a:t>
-            </a:r>
-            <a:r>
-              <a:rPr lang="en-US" dirty="0" err="1" smtClean="0"/>
-              <a:t>i</a:t>
-            </a:r>
-            <a:r>
-              <a:rPr lang="en-US" dirty="0" smtClean="0"/>
-              <a:t> </a:t>
-            </a:r>
-            <a:r>
-              <a:rPr lang="en-US" dirty="0" err="1" smtClean="0"/>
-              <a:t>verktøy</a:t>
-            </a:r>
-            <a:r>
-              <a:rPr lang="en-US" dirty="0" err="1" smtClean="0"/>
-              <a:t>kassa</a:t>
-            </a:r>
-            <a:endParaRPr lang="en-US" dirty="0" smtClean="0"/>
-          </a:p>
-          <a:p>
-            <a:r>
-              <a:rPr lang="en-US" dirty="0" err="1" smtClean="0"/>
-              <a:t>Lesbarhet</a:t>
-            </a:r>
-            <a:endParaRPr lang="en-US" dirty="0" smtClean="0"/>
-          </a:p>
-          <a:p>
+              <a:t>det</a:t>
+            </a:r>
+            <a:r>
+              <a:rPr lang="en-US" dirty="0" smtClean="0"/>
+              <a:t>??</a:t>
+            </a:r>
+          </a:p>
+          <a:p>
+            <a:r>
+              <a:rPr lang="en-US" dirty="0" err="1" smtClean="0"/>
+              <a:t>Hvorfor</a:t>
+            </a:r>
+            <a:r>
+              <a:rPr lang="en-US" dirty="0" smtClean="0"/>
+              <a:t>?</a:t>
+            </a:r>
             <a:endParaRPr lang="en-US" dirty="0" smtClean="0"/>
           </a:p>
         </p:txBody>
@@ -3582,17 +3575,41 @@
           <a:lstStyle/>
           <a:p>
             <a:r>
-              <a:rPr lang="en-US" dirty="0" err="1" smtClean="0"/>
-              <a:t>Fordeler</a:t>
-            </a:r>
-            <a:r>
-              <a:rPr lang="en-US" dirty="0" smtClean="0"/>
-              <a:t> “pure” </a:t>
+              <a:rPr lang="en-US" dirty="0" smtClean="0"/>
+              <a:t>R</a:t>
+            </a:r>
+            <a:r>
+              <a:rPr lang="en-US" dirty="0" smtClean="0"/>
+              <a:t>ene</a:t>
+            </a:r>
+            <a:r>
+              <a:rPr lang="en-US" dirty="0" smtClean="0"/>
+              <a:t> </a:t>
             </a:r>
             <a:r>
               <a:rPr lang="en-US" dirty="0" err="1" smtClean="0"/>
               <a:t>funksjoner</a:t>
             </a:r>
+            <a:r>
+              <a:rPr lang="en-US" dirty="0" smtClean="0"/>
+              <a:t>(</a:t>
+            </a:r>
+            <a:r>
+              <a:rPr lang="en-US" dirty="0" err="1" smtClean="0"/>
+              <a:t>Hva</a:t>
+            </a:r>
+            <a:r>
+              <a:rPr lang="en-US" dirty="0" smtClean="0"/>
+              <a:t>, </a:t>
+            </a:r>
+            <a:r>
+              <a:rPr lang="en-US" dirty="0" err="1" smtClean="0"/>
+              <a:t>hvorfor</a:t>
+            </a:r>
+            <a:r>
+              <a:rPr lang="en-US" dirty="0" smtClean="0"/>
+              <a:t>)</a:t>
+            </a:r>
             <a:endParaRPr lang="en-US" dirty="0"/>
           </a:p>
         </p:txBody>
@@ -3614,6 +3631,68 @@
           <a:p>
             <a:r>
               <a:rPr lang="en-US" dirty="0" err="1" smtClean="0"/>
+              <a:t>Funksjoner</a:t>
+            </a:r>
+            <a:r>
+              <a:rPr lang="en-US" dirty="0" smtClean="0"/>
+              <a:t> </a:t>
+            </a:r>
+            <a:r>
+              <a:rPr lang="en-US" dirty="0" err="1" smtClean="0"/>
+              <a:t>uten</a:t>
+            </a:r>
+            <a:r>
+              <a:rPr lang="en-US" dirty="0" smtClean="0"/>
+              <a:t> </a:t>
+            </a:r>
+            <a:r>
+              <a:rPr lang="en-US" dirty="0" smtClean="0"/>
+              <a:t>side-</a:t>
+            </a:r>
+            <a:r>
+              <a:rPr lang="en-US" dirty="0" err="1" smtClean="0"/>
+              <a:t>effekter</a:t>
+            </a:r>
+            <a:endParaRPr lang="en-US" dirty="0" smtClean="0"/>
+          </a:p>
+          <a:p>
+            <a:r>
+              <a:rPr lang="en-US" dirty="0" err="1" smtClean="0"/>
+              <a:t>Mer</a:t>
+            </a:r>
+            <a:r>
+              <a:rPr lang="en-US" dirty="0" smtClean="0"/>
+              <a:t> </a:t>
+            </a:r>
+            <a:r>
+              <a:rPr lang="en-US" dirty="0" err="1" smtClean="0"/>
+              <a:t>utfyllende</a:t>
+            </a:r>
+            <a:r>
+              <a:rPr lang="en-US" dirty="0" smtClean="0"/>
+              <a:t> </a:t>
+            </a:r>
+            <a:r>
+              <a:rPr lang="en-US" dirty="0" err="1" smtClean="0"/>
+              <a:t>om</a:t>
+            </a:r>
+            <a:r>
+              <a:rPr lang="en-US" dirty="0" smtClean="0"/>
+              <a:t> </a:t>
+            </a:r>
+            <a:r>
+              <a:rPr lang="en-US" dirty="0" err="1" smtClean="0"/>
+              <a:t>hva</a:t>
+            </a:r>
+            <a:r>
+              <a:rPr lang="en-US" dirty="0" smtClean="0"/>
+              <a:t>…</a:t>
+            </a:r>
+            <a:endParaRPr lang="en-US" dirty="0" smtClean="0"/>
+          </a:p>
+          <a:p>
+            <a:r>
+              <a:rPr lang="en-US" dirty="0" err="1" smtClean="0"/>
               <a:t>Resonering</a:t>
             </a:r>
             <a:r>
@@ -3662,13 +3741,71 @@
               <a:rPr lang="en-US" dirty="0" err="1" smtClean="0"/>
               <a:t>funksjoner</a:t>
             </a:r>
+            <a:r>
+              <a:rPr lang="en-US" dirty="0" smtClean="0"/>
+              <a:t>(</a:t>
+            </a:r>
+            <a:r>
+              <a:rPr lang="en-US" dirty="0" err="1" smtClean="0"/>
+              <a:t>egen</a:t>
+            </a:r>
+            <a:r>
+              <a:rPr lang="en-US" dirty="0" smtClean="0"/>
+              <a:t> slide)</a:t>
+            </a:r>
             <a:endParaRPr lang="en-US" dirty="0" smtClean="0"/>
           </a:p>
           <a:p>
             <a:r>
               <a:rPr lang="en-US" dirty="0" err="1" smtClean="0"/>
-              <a:t>paralellprosessering</a:t>
-            </a:r>
+              <a:t>Parallellprosessering</a:t>
+            </a:r>
+            <a:endParaRPr lang="en-US" dirty="0" smtClean="0"/>
+          </a:p>
+          <a:p>
+            <a:r>
+              <a:rPr lang="en-US" dirty="0" smtClean="0"/>
+              <a:t>Ref transparency, </a:t>
+            </a:r>
+            <a:r>
+              <a:rPr lang="en-US" dirty="0" err="1" smtClean="0"/>
+              <a:t>når</a:t>
+            </a:r>
+            <a:r>
+              <a:rPr lang="en-US" dirty="0" smtClean="0"/>
+              <a:t> du bare </a:t>
+            </a:r>
+            <a:r>
+              <a:rPr lang="en-US" dirty="0" err="1" smtClean="0"/>
+              <a:t>kan</a:t>
+            </a:r>
+            <a:r>
+              <a:rPr lang="en-US" dirty="0" smtClean="0"/>
+              <a:t> </a:t>
+            </a:r>
+            <a:r>
+              <a:rPr lang="en-US" dirty="0" err="1" smtClean="0"/>
+              <a:t>bytte</a:t>
+            </a:r>
+            <a:r>
+              <a:rPr lang="en-US" dirty="0" smtClean="0"/>
+              <a:t> </a:t>
+            </a:r>
+            <a:r>
+              <a:rPr lang="en-US" dirty="0" err="1"/>
+              <a:t>u</a:t>
+            </a:r>
+            <a:r>
+              <a:rPr lang="en-US" dirty="0" err="1" smtClean="0"/>
+              <a:t>t</a:t>
+            </a:r>
+            <a:r>
+              <a:rPr lang="en-US" dirty="0" smtClean="0"/>
+              <a:t>…</a:t>
+            </a:r>
+            <a:endParaRPr lang="en-US" dirty="0" smtClean="0"/>
+          </a:p>
+          <a:p>
             <a:endParaRPr lang="en-US" dirty="0"/>
           </a:p>
         </p:txBody>
@@ -3834,7 +3971,15 @@
           <a:bodyPr/>
           <a:lstStyle/>
           <a:p>
-            <a:endParaRPr lang="en-US"/>
+            <a:r>
+              <a:rPr lang="en-US" dirty="0" smtClean="0"/>
+              <a:t>Fold left/right </a:t>
+            </a:r>
+            <a:r>
+              <a:rPr lang="en-US" dirty="0" err="1" smtClean="0"/>
+              <a:t>grafisk</a:t>
+            </a:r>
+            <a:endParaRPr lang="en-US" dirty="0"/>
           </a:p>
         </p:txBody>
       </p:sp>
@@ -3853,7 +3998,7 @@
           <a:bodyPr/>
           <a:lstStyle/>
           <a:p>
-            <a:endParaRPr lang="en-US"/>
+            <a:endParaRPr lang="en-US" dirty="0"/>
           </a:p>
         </p:txBody>
       </p:sp>
@@ -3861,6 +4006,78 @@
     <p:extLst>
       <p:ext uri="{BB962C8B-B14F-4D97-AF65-F5344CB8AC3E}">
         <p14:creationId xmlns:p14="http://schemas.microsoft.com/office/powerpoint/2010/main" val="3032431018"/>
+      </p:ext>
+    </p:extLst>
+  </p:cSld>
+  <p:clrMapOvr>
+    <a:masterClrMapping/>
+  </p:clrMapOvr>
+</p:sld>
+</file>
+
+<file path=ppt/slides/slide7.xml><?xml version="1.0" encoding="utf-8"?>
+<p:sld xmlns:a="http://schemas.openxmlformats.org/drawingml/2006/main" xmlns:r="http://schemas.openxmlformats.org/officeDocument/2006/relationships" xmlns:p="http://schemas.openxmlformats.org/presentationml/2006/main">
+  <p:cSld>
+    <p:spTree>
+      <p:nvGrpSpPr>
+        <p:cNvPr id="1" name=""/>
+        <p:cNvGrpSpPr/>
+        <p:nvPr/>
+      </p:nvGrpSpPr>
+      <p:grpSpPr>
+        <a:xfrm>
+          <a:off x="0" y="0"/>
+          <a:ext cx="0" cy="0"/>
+          <a:chOff x="0" y="0"/>
+          <a:chExt cx="0" cy="0"/>
+        </a:xfrm>
+      </p:grpSpPr>
+      <p:sp>
+        <p:nvSpPr>
+          <p:cNvPr id="2" name="Title 1"/>
+          <p:cNvSpPr>
+            <a:spLocks noGrp="1"/>
+          </p:cNvSpPr>
+          <p:nvPr>
+            <p:ph type="title"/>
+          </p:nvPr>
+        </p:nvSpPr>
+        <p:spPr/>
+        <p:txBody>
+          <a:bodyPr/>
+          <a:lstStyle/>
+          <a:p>
+            <a:r>
+              <a:rPr lang="en-US" dirty="0" smtClean="0"/>
+              <a:t>Map / filter </a:t>
+            </a:r>
+            <a:endParaRPr lang="en-US" dirty="0"/>
+          </a:p>
+        </p:txBody>
+      </p:sp>
+      <p:sp>
+        <p:nvSpPr>
+          <p:cNvPr id="3" name="Content Placeholder 2"/>
+          <p:cNvSpPr>
+            <a:spLocks noGrp="1"/>
+          </p:cNvSpPr>
+          <p:nvPr>
+            <p:ph idx="1"/>
+          </p:nvPr>
+        </p:nvSpPr>
+        <p:spPr/>
+        <p:txBody>
+          <a:bodyPr/>
+          <a:lstStyle/>
+          <a:p>
+            <a:endParaRPr lang="en-US" dirty="0"/>
+          </a:p>
+        </p:txBody>
+      </p:sp>
+    </p:spTree>
+    <p:extLst>
+      <p:ext uri="{BB962C8B-B14F-4D97-AF65-F5344CB8AC3E}">
+        <p14:creationId xmlns:p14="http://schemas.microsoft.com/office/powerpoint/2010/main" val="1192375539"/>
       </p:ext>
     </p:extLst>
   </p:cSld>

</xml_diff>

<commit_message>
fikset litt mer på slides
</commit_message>
<xml_diff>
--- a/presentation/FunctionalProgramming0.pptx
+++ b/presentation/FunctionalProgramming0.pptx
@@ -4564,13 +4564,8 @@
             </a:pPr>
             <a:r>
               <a:rPr lang="en-US" sz="2800" dirty="0" smtClean="0"/>
-              <a:t>// object = </a:t>
-            </a:r>
-            <a:r>
-              <a:rPr lang="en-US" sz="2800" smtClean="0"/>
-              <a:t>singleton object</a:t>
-            </a:r>
-            <a:endParaRPr lang="en-US" sz="2800" dirty="0" smtClean="0"/>
+              <a:t>// object = singleton object</a:t>
+            </a:r>
           </a:p>
           <a:p>
             <a:pPr marL="0" indent="0">
@@ -4693,7 +4688,9 @@
         </p:nvSpPr>
         <p:spPr/>
         <p:txBody>
-          <a:bodyPr/>
+          <a:bodyPr>
+            <a:normAutofit/>
+          </a:bodyPr>
           <a:lstStyle/>
           <a:p>
             <a:pPr marL="0" indent="0">
@@ -4777,8 +4774,12 @@
               <a:buNone/>
             </a:pPr>
             <a:r>
+              <a:rPr lang="en-US" sz="2800" dirty="0" smtClean="0"/>
+              <a:t>Vi </a:t>
+            </a:r>
+            <a:r>
               <a:rPr lang="en-US" sz="2800" dirty="0" err="1" smtClean="0"/>
-              <a:t>Funksjoner</a:t>
+              <a:t>bygger</a:t>
             </a:r>
             <a:r>
               <a:rPr lang="en-US" sz="2800" dirty="0" smtClean="0"/>
@@ -4786,7 +4787,7 @@
             </a:r>
             <a:r>
               <a:rPr lang="en-US" sz="2800" dirty="0" err="1" smtClean="0"/>
-              <a:t>er</a:t>
+              <a:t>opp</a:t>
             </a:r>
             <a:r>
               <a:rPr lang="en-US" sz="2800" dirty="0" smtClean="0"/>
@@ -4794,7 +4795,7 @@
             </a:r>
             <a:r>
               <a:rPr lang="en-US" sz="2800" dirty="0" err="1" smtClean="0"/>
-              <a:t>førsteklasses</a:t>
+              <a:t>programmende</a:t>
             </a:r>
             <a:r>
               <a:rPr lang="en-US" sz="2800" dirty="0" smtClean="0"/>
@@ -4802,7 +4803,23 @@
             </a:r>
             <a:r>
               <a:rPr lang="en-US" sz="2800" dirty="0" err="1" smtClean="0"/>
-              <a:t>entiter</a:t>
+              <a:t>ved</a:t>
+            </a:r>
+            <a:r>
+              <a:rPr lang="en-US" sz="2800" dirty="0" smtClean="0"/>
+              <a:t> </a:t>
+            </a:r>
+            <a:r>
+              <a:rPr lang="en-US" sz="2800" dirty="0" err="1" smtClean="0"/>
+              <a:t>komponerer</a:t>
+            </a:r>
+            <a:r>
+              <a:rPr lang="en-US" sz="2800" dirty="0" smtClean="0"/>
+              <a:t> </a:t>
+            </a:r>
+            <a:r>
+              <a:rPr lang="en-US" sz="2800" dirty="0" err="1" smtClean="0"/>
+              <a:t>funksjoner</a:t>
             </a:r>
             <a:r>
               <a:rPr lang="en-US" sz="2800" dirty="0" smtClean="0"/>
@@ -4814,16 +4831,12 @@
               <a:buNone/>
             </a:pPr>
             <a:r>
+              <a:rPr lang="en-US" sz="2800" dirty="0" smtClean="0"/>
+              <a:t>Vi </a:t>
+            </a:r>
+            <a:r>
               <a:rPr lang="en-US" sz="2800" dirty="0" err="1" smtClean="0"/>
-              <a:t>Funksjoner</a:t>
-            </a:r>
-            <a:r>
-              <a:rPr lang="en-US" sz="2800" dirty="0" smtClean="0"/>
-              <a:t> </a:t>
-            </a:r>
-            <a:r>
-              <a:rPr lang="en-US" sz="2800" dirty="0" err="1" smtClean="0"/>
-              <a:t>har</a:t>
+              <a:t>foretrekker</a:t>
             </a:r>
             <a:r>
               <a:rPr lang="en-US" sz="2800" dirty="0" smtClean="0"/>
@@ -4834,16 +4847,84 @@
               <a:t>ikke</a:t>
             </a:r>
             <a:r>
-              <a:rPr lang="en-US" sz="2800" dirty="0"/>
-              <a:t> </a:t>
+              <a:rPr lang="en-US" sz="2800" dirty="0" err="1"/>
+              <a:t>-</a:t>
+            </a:r>
+            <a:r>
+              <a:rPr lang="en-US" sz="2800" dirty="0" err="1" smtClean="0"/>
+              <a:t>muterbare</a:t>
             </a:r>
             <a:r>
               <a:rPr lang="en-US" sz="2800" dirty="0" smtClean="0"/>
-              <a:t>side </a:t>
+              <a:t> data </a:t>
             </a:r>
             <a:r>
               <a:rPr lang="en-US" sz="2800" dirty="0" err="1" smtClean="0"/>
-              <a:t>effekter</a:t>
+              <a:t>og</a:t>
+            </a:r>
+            <a:r>
+              <a:rPr lang="en-US" sz="2800" dirty="0" smtClean="0"/>
+              <a:t> </a:t>
+            </a:r>
+            <a:r>
+              <a:rPr lang="en-US" sz="2800" dirty="0" err="1" smtClean="0"/>
+              <a:t>datastrukturer</a:t>
+            </a:r>
+            <a:r>
+              <a:rPr lang="en-US" sz="2800" dirty="0" smtClean="0"/>
+              <a:t> </a:t>
+            </a:r>
+            <a:r>
+              <a:rPr lang="en-US" sz="2800" dirty="0" err="1" smtClean="0"/>
+              <a:t>hvor</a:t>
+            </a:r>
+            <a:r>
+              <a:rPr lang="en-US" sz="2800" dirty="0" smtClean="0"/>
+              <a:t> </a:t>
+            </a:r>
+            <a:r>
+              <a:rPr lang="en-US" sz="2800" smtClean="0"/>
+              <a:t>funksjoner</a:t>
+            </a:r>
+            <a:r>
+              <a:rPr lang="en-US" sz="2800" dirty="0" smtClean="0"/>
+              <a:t> </a:t>
+            </a:r>
+            <a:r>
+              <a:rPr lang="en-US" sz="2800" dirty="0" err="1" smtClean="0"/>
+              <a:t>transformere</a:t>
+            </a:r>
+            <a:r>
+              <a:rPr lang="en-US" sz="2800" dirty="0" smtClean="0"/>
+              <a:t> </a:t>
+            </a:r>
+            <a:r>
+              <a:rPr lang="en-US" sz="2800" dirty="0" err="1" smtClean="0"/>
+              <a:t>fra</a:t>
+            </a:r>
+            <a:r>
+              <a:rPr lang="en-US" sz="2800" dirty="0" smtClean="0"/>
+              <a:t> en </a:t>
+            </a:r>
+            <a:r>
+              <a:rPr lang="en-US" sz="2800" dirty="0" err="1" smtClean="0"/>
+              <a:t>tilstand</a:t>
+            </a:r>
+            <a:r>
+              <a:rPr lang="en-US" sz="2800" dirty="0" smtClean="0"/>
+              <a:t> </a:t>
+            </a:r>
+            <a:r>
+              <a:rPr lang="en-US" sz="2800" dirty="0" err="1" smtClean="0"/>
+              <a:t>til</a:t>
+            </a:r>
+            <a:r>
+              <a:rPr lang="en-US" sz="2800" dirty="0" smtClean="0"/>
+              <a:t> en </a:t>
+            </a:r>
+            <a:r>
+              <a:rPr lang="en-US" sz="2800" dirty="0" err="1" smtClean="0"/>
+              <a:t>annen</a:t>
             </a:r>
             <a:r>
               <a:rPr lang="en-US" sz="2800" dirty="0" smtClean="0"/>
@@ -4856,7 +4937,7 @@
             </a:pPr>
             <a:r>
               <a:rPr lang="en-US" sz="2800" dirty="0" err="1" smtClean="0"/>
-              <a:t>Datastrukturer</a:t>
+              <a:t>Tenke</a:t>
             </a:r>
             <a:r>
               <a:rPr lang="en-US" sz="2800" dirty="0" smtClean="0"/>
@@ -4864,43 +4945,11 @@
             </a:r>
             <a:r>
               <a:rPr lang="en-US" sz="2800" dirty="0" err="1" smtClean="0"/>
-              <a:t>er</a:t>
+              <a:t>unix</a:t>
             </a:r>
             <a:r>
               <a:rPr lang="en-US" sz="2800" dirty="0" smtClean="0"/>
-              <a:t> </a:t>
-            </a:r>
-            <a:r>
-              <a:rPr lang="en-US" sz="2800" dirty="0" err="1" smtClean="0"/>
-              <a:t>ikke</a:t>
-            </a:r>
-            <a:r>
-              <a:rPr lang="en-US" sz="2800" dirty="0" smtClean="0"/>
-              <a:t> </a:t>
-            </a:r>
-            <a:r>
-              <a:rPr lang="en-US" sz="2800" dirty="0" err="1" smtClean="0"/>
-              <a:t>muterbare</a:t>
-            </a:r>
-            <a:r>
-              <a:rPr lang="en-US" sz="2800" dirty="0" smtClean="0"/>
-              <a:t> men vi </a:t>
-            </a:r>
-            <a:r>
-              <a:rPr lang="en-US" sz="2800" dirty="0" err="1" smtClean="0"/>
-              <a:t>transformerer</a:t>
-            </a:r>
-            <a:r>
-              <a:rPr lang="en-US" sz="2800" dirty="0" smtClean="0"/>
-              <a:t> data med </a:t>
-            </a:r>
-            <a:r>
-              <a:rPr lang="en-US" sz="2800" dirty="0" err="1" smtClean="0"/>
-              <a:t>funksjoner</a:t>
-            </a:r>
-            <a:r>
-              <a:rPr lang="en-US" sz="2800" dirty="0" smtClean="0"/>
-              <a:t>.</a:t>
+              <a:t> pipes</a:t>
             </a:r>
           </a:p>
           <a:p>

</xml_diff>